<commit_message>
Tweaks to Sep 18
</commit_message>
<xml_diff>
--- a/Slides/091819.pptx
+++ b/Slides/091819.pptx
@@ -19337,7 +19337,43 @@
                   <a:srgbClr val="0000FF"/>
                 </a:solidFill>
               </a:rPr>
-              <a:t>Assignment 1 due on September 28</a:t>
+              <a:t>Assignment 1 due on September 26</a:t>
+            </a:r>
+          </a:p>
+          <a:p>
+            <a:pPr lvl="1"/>
+            <a:r>
+              <a:rPr lang="en-US" dirty="0" err="1">
+                <a:solidFill>
+                  <a:srgbClr val="0000FF"/>
+                </a:solidFill>
+              </a:rPr>
+              <a:t>Autograder</a:t>
+            </a:r>
+            <a:r>
+              <a:rPr lang="en-US" dirty="0">
+                <a:solidFill>
+                  <a:srgbClr val="0000FF"/>
+                </a:solidFill>
+              </a:rPr>
+              <a:t> out soon</a:t>
+            </a:r>
+          </a:p>
+          <a:p>
+            <a:pPr lvl="1"/>
+            <a:endParaRPr lang="en-US" dirty="0"/>
+          </a:p>
+          <a:p>
+            <a:r>
+              <a:rPr lang="en-US" dirty="0"/>
+              <a:t>TCP is provides stream-level guarantees</a:t>
+            </a:r>
+          </a:p>
+          <a:p>
+            <a:pPr lvl="2"/>
+            <a:r>
+              <a:rPr lang="en-US" dirty="0"/>
+              <a:t>Not message-level</a:t>
             </a:r>
           </a:p>
           <a:p>
@@ -19429,6 +19465,116 @@
   <p:clrMapOvr>
     <a:masterClrMapping/>
   </p:clrMapOvr>
+  <p:timing>
+    <p:tnLst>
+      <p:par>
+        <p:cTn id="1" dur="indefinite" restart="never" nodeType="tmRoot">
+          <p:childTnLst>
+            <p:seq concurrent="1" nextAc="seek">
+              <p:cTn id="2" dur="indefinite" nodeType="mainSeq">
+                <p:childTnLst>
+                  <p:par>
+                    <p:cTn id="3" fill="hold">
+                      <p:stCondLst>
+                        <p:cond delay="indefinite"/>
+                      </p:stCondLst>
+                      <p:childTnLst>
+                        <p:par>
+                          <p:cTn id="4" fill="hold">
+                            <p:stCondLst>
+                              <p:cond delay="0"/>
+                            </p:stCondLst>
+                            <p:childTnLst>
+                              <p:par>
+                                <p:cTn id="5" presetID="1" presetClass="entr" presetSubtype="0" fill="hold" nodeType="clickEffect">
+                                  <p:stCondLst>
+                                    <p:cond delay="0"/>
+                                  </p:stCondLst>
+                                  <p:childTnLst>
+                                    <p:set>
+                                      <p:cBhvr>
+                                        <p:cTn id="6" dur="1" fill="hold">
+                                          <p:stCondLst>
+                                            <p:cond delay="0"/>
+                                          </p:stCondLst>
+                                        </p:cTn>
+                                        <p:tgtEl>
+                                          <p:spTgt spid="8">
+                                            <p:txEl>
+                                              <p:pRg st="3" end="3"/>
+                                            </p:txEl>
+                                          </p:spTgt>
+                                        </p:tgtEl>
+                                        <p:attrNameLst>
+                                          <p:attrName>style.visibility</p:attrName>
+                                        </p:attrNameLst>
+                                      </p:cBhvr>
+                                      <p:to>
+                                        <p:strVal val="visible"/>
+                                      </p:to>
+                                    </p:set>
+                                  </p:childTnLst>
+                                </p:cTn>
+                              </p:par>
+                              <p:par>
+                                <p:cTn id="7" presetID="1" presetClass="entr" presetSubtype="0" fill="hold" nodeType="withEffect">
+                                  <p:stCondLst>
+                                    <p:cond delay="0"/>
+                                  </p:stCondLst>
+                                  <p:childTnLst>
+                                    <p:set>
+                                      <p:cBhvr>
+                                        <p:cTn id="8" dur="1" fill="hold">
+                                          <p:stCondLst>
+                                            <p:cond delay="0"/>
+                                          </p:stCondLst>
+                                        </p:cTn>
+                                        <p:tgtEl>
+                                          <p:spTgt spid="8">
+                                            <p:txEl>
+                                              <p:pRg st="4" end="4"/>
+                                            </p:txEl>
+                                          </p:spTgt>
+                                        </p:tgtEl>
+                                        <p:attrNameLst>
+                                          <p:attrName>style.visibility</p:attrName>
+                                        </p:attrNameLst>
+                                      </p:cBhvr>
+                                      <p:to>
+                                        <p:strVal val="visible"/>
+                                      </p:to>
+                                    </p:set>
+                                  </p:childTnLst>
+                                </p:cTn>
+                              </p:par>
+                            </p:childTnLst>
+                          </p:cTn>
+                        </p:par>
+                      </p:childTnLst>
+                    </p:cTn>
+                  </p:par>
+                </p:childTnLst>
+              </p:cTn>
+              <p:prevCondLst>
+                <p:cond evt="onPrev" delay="0">
+                  <p:tgtEl>
+                    <p:sldTgt/>
+                  </p:tgtEl>
+                </p:cond>
+              </p:prevCondLst>
+              <p:nextCondLst>
+                <p:cond evt="onNext" delay="0">
+                  <p:tgtEl>
+                    <p:sldTgt/>
+                  </p:tgtEl>
+                </p:cond>
+              </p:nextCondLst>
+            </p:seq>
+          </p:childTnLst>
+        </p:cTn>
+      </p:par>
+    </p:tnLst>
+  </p:timing>
 </p:sld>
 </file>
 
@@ -33320,13 +33466,6 @@
           <a:bodyPr/>
           <a:lstStyle/>
           <a:p>
-            <a:r>
-              <a:rPr lang="en-US" dirty="0"/>
-              <a:t>Aside: </a:t>
-            </a:r>
-            <a:br>
-              <a:rPr lang="en-US" dirty="0"/>
-            </a:br>
             <a:r>
               <a:rPr lang="en-US" dirty="0"/>
               <a:t>Why pipeline and why not?</a:t>

</xml_diff>